<commit_message>
Revisión de presentación de Sprint 01.
</commit_message>
<xml_diff>
--- a/Presentaciones/Sprint 01_Review.pptx
+++ b/Presentaciones/Sprint 01_Review.pptx
@@ -5,7 +5,7 @@
     <p:sldMasterId id="2147483648" r:id="rId1"/>
   </p:sldMasterIdLst>
   <p:notesMasterIdLst>
-    <p:notesMasterId r:id="rId14"/>
+    <p:notesMasterId r:id="rId15"/>
   </p:notesMasterIdLst>
   <p:sldIdLst>
     <p:sldId id="256" r:id="rId2"/>
@@ -18,8 +18,9 @@
     <p:sldId id="302" r:id="rId9"/>
     <p:sldId id="303" r:id="rId10"/>
     <p:sldId id="298" r:id="rId11"/>
-    <p:sldId id="300" r:id="rId12"/>
-    <p:sldId id="296" r:id="rId13"/>
+    <p:sldId id="304" r:id="rId12"/>
+    <p:sldId id="300" r:id="rId13"/>
+    <p:sldId id="296" r:id="rId14"/>
   </p:sldIdLst>
   <p:sldSz cx="12192000" cy="6858000"/>
   <p:notesSz cx="6858000" cy="9144000"/>
@@ -2045,6 +2046,156 @@
         <p:cNvPr id="1" name="">
           <a:extLst>
             <a:ext uri="{FF2B5EF4-FFF2-40B4-BE49-F238E27FC236}">
+              <a16:creationId xmlns:a16="http://schemas.microsoft.com/office/drawing/2014/main" id="{FD67E238-6E6F-19EF-E94F-672E049AB4DD}"/>
+            </a:ext>
+          </a:extLst>
+        </p:cNvPr>
+        <p:cNvGrpSpPr/>
+        <p:nvPr/>
+      </p:nvGrpSpPr>
+      <p:grpSpPr>
+        <a:xfrm>
+          <a:off x="0" y="0"/>
+          <a:ext cx="0" cy="0"/>
+          <a:chOff x="0" y="0"/>
+          <a:chExt cx="0" cy="0"/>
+        </a:xfrm>
+      </p:grpSpPr>
+      <p:sp>
+        <p:nvSpPr>
+          <p:cNvPr id="597" name="PlaceHolder 1">
+            <a:extLst>
+              <a:ext uri="{FF2B5EF4-FFF2-40B4-BE49-F238E27FC236}">
+                <a16:creationId xmlns:a16="http://schemas.microsoft.com/office/drawing/2014/main" id="{132B52F1-2F0E-057A-1C19-C7EEC9BA939D}"/>
+              </a:ext>
+            </a:extLst>
+          </p:cNvPr>
+          <p:cNvSpPr>
+            <a:spLocks noGrp="1"/>
+          </p:cNvSpPr>
+          <p:nvPr>
+            <p:ph type="body"/>
+          </p:nvPr>
+        </p:nvSpPr>
+        <p:spPr>
+          <a:xfrm>
+            <a:off x="676080" y="4722480"/>
+            <a:ext cx="5392080" cy="4457520"/>
+          </a:xfrm>
+          <a:prstGeom prst="rect">
+            <a:avLst/>
+          </a:prstGeom>
+          <a:noFill/>
+          <a:ln w="0">
+            <a:noFill/>
+          </a:ln>
+        </p:spPr>
+        <p:txBody>
+          <a:bodyPr lIns="92520" tIns="46440" rIns="92520" bIns="46440" anchor="t">
+            <a:noAutofit/>
+          </a:bodyPr>
+          <a:lstStyle/>
+          <a:p>
+            <a:pPr marL="216000" indent="-216000">
+              <a:buNone/>
+            </a:pPr>
+            <a:endParaRPr lang="es-ES" sz="1800" b="0" strike="noStrike" spc="-1">
+              <a:solidFill>
+                <a:srgbClr val="000000"/>
+              </a:solidFill>
+              <a:latin typeface="Arial"/>
+            </a:endParaRPr>
+          </a:p>
+        </p:txBody>
+      </p:sp>
+      <p:sp>
+        <p:nvSpPr>
+          <p:cNvPr id="598" name="CustomShape 119">
+            <a:extLst>
+              <a:ext uri="{FF2B5EF4-FFF2-40B4-BE49-F238E27FC236}">
+                <a16:creationId xmlns:a16="http://schemas.microsoft.com/office/drawing/2014/main" id="{68595217-A7AA-75E4-2F03-564582AA4109}"/>
+              </a:ext>
+            </a:extLst>
+          </p:cNvPr>
+          <p:cNvSpPr/>
+          <p:nvPr/>
+        </p:nvSpPr>
+        <p:spPr>
+          <a:xfrm>
+            <a:off x="3830400" y="9443520"/>
+            <a:ext cx="2912400" cy="480600"/>
+          </a:xfrm>
+          <a:prstGeom prst="rect">
+            <a:avLst/>
+          </a:prstGeom>
+          <a:noFill/>
+          <a:ln w="9360">
+            <a:noFill/>
+          </a:ln>
+        </p:spPr>
+        <p:style>
+          <a:lnRef idx="0">
+            <a:scrgbClr r="0" g="0" b="0"/>
+          </a:lnRef>
+          <a:fillRef idx="0">
+            <a:scrgbClr r="0" g="0" b="0"/>
+          </a:fillRef>
+          <a:effectRef idx="0">
+            <a:scrgbClr r="0" g="0" b="0"/>
+          </a:effectRef>
+          <a:fontRef idx="minor"/>
+        </p:style>
+        <p:txBody>
+          <a:bodyPr lIns="92520" tIns="46440" rIns="92520" bIns="46440" anchor="b">
+            <a:noAutofit/>
+          </a:bodyPr>
+          <a:lstStyle/>
+          <a:p>
+            <a:pPr algn="r" defTabSz="914400">
+              <a:lnSpc>
+                <a:spcPct val="100000"/>
+              </a:lnSpc>
+            </a:pPr>
+            <a:fld id="{69B26DC3-D8D0-4E48-806B-9A34D9996EE9}" type="slidenum">
+              <a:rPr lang="es-ES" sz="1200" b="0" strike="noStrike" spc="-1">
+                <a:solidFill>
+                  <a:srgbClr val="000000"/>
+                </a:solidFill>
+                <a:latin typeface="Times New Roman"/>
+                <a:ea typeface="+mn-ea"/>
+              </a:rPr>
+              <a:t>11</a:t>
+            </a:fld>
+            <a:endParaRPr lang="es-ES" sz="1200" b="0" strike="noStrike" spc="-1">
+              <a:solidFill>
+                <a:srgbClr val="000000"/>
+              </a:solidFill>
+              <a:latin typeface="Arial"/>
+            </a:endParaRPr>
+          </a:p>
+        </p:txBody>
+      </p:sp>
+    </p:spTree>
+    <p:extLst>
+      <p:ext uri="{BB962C8B-B14F-4D97-AF65-F5344CB8AC3E}">
+        <p14:creationId xmlns:p14="http://schemas.microsoft.com/office/powerpoint/2010/main" val="1037806382"/>
+      </p:ext>
+    </p:extLst>
+  </p:cSld>
+  <p:clrMapOvr>
+    <a:masterClrMapping/>
+  </p:clrMapOvr>
+</p:notes>
+</file>
+
+<file path=ppt/notesSlides/notesSlide11.xml><?xml version="1.0" encoding="utf-8"?>
+<p:notes xmlns:a="http://schemas.openxmlformats.org/drawingml/2006/main" xmlns:r="http://schemas.openxmlformats.org/officeDocument/2006/relationships" xmlns:p="http://schemas.openxmlformats.org/presentationml/2006/main">
+  <p:cSld>
+    <p:spTree>
+      <p:nvGrpSpPr>
+        <p:cNvPr id="1" name="">
+          <a:extLst>
+            <a:ext uri="{FF2B5EF4-FFF2-40B4-BE49-F238E27FC236}">
               <a16:creationId xmlns:a16="http://schemas.microsoft.com/office/drawing/2014/main" id="{B0A5561C-125C-F16B-A76E-421E7F54F9F0}"/>
             </a:ext>
           </a:extLst>
@@ -2163,7 +2314,7 @@
                 <a:latin typeface="Times New Roman"/>
                 <a:ea typeface="+mn-ea"/>
               </a:rPr>
-              <a:t>11</a:t>
+              <a:t>12</a:t>
             </a:fld>
             <a:endParaRPr lang="es-ES" sz="1200" b="0" strike="noStrike" spc="-1">
               <a:solidFill>
@@ -9074,6 +9225,1106 @@
         <p:cNvPr id="1" name="">
           <a:extLst>
             <a:ext uri="{FF2B5EF4-FFF2-40B4-BE49-F238E27FC236}">
+              <a16:creationId xmlns:a16="http://schemas.microsoft.com/office/drawing/2014/main" id="{5D833BE9-1623-A2B9-2479-8F88E2BCAC35}"/>
+            </a:ext>
+          </a:extLst>
+        </p:cNvPr>
+        <p:cNvGrpSpPr/>
+        <p:nvPr/>
+      </p:nvGrpSpPr>
+      <p:grpSpPr>
+        <a:xfrm>
+          <a:off x="0" y="0"/>
+          <a:ext cx="0" cy="0"/>
+          <a:chOff x="0" y="0"/>
+          <a:chExt cx="0" cy="0"/>
+        </a:xfrm>
+      </p:grpSpPr>
+      <p:sp>
+        <p:nvSpPr>
+          <p:cNvPr id="86" name="CustomShape 110">
+            <a:extLst>
+              <a:ext uri="{FF2B5EF4-FFF2-40B4-BE49-F238E27FC236}">
+                <a16:creationId xmlns:a16="http://schemas.microsoft.com/office/drawing/2014/main" id="{E532B5E1-7522-A2A7-5BE0-9D958B920CDC}"/>
+              </a:ext>
+            </a:extLst>
+          </p:cNvPr>
+          <p:cNvSpPr/>
+          <p:nvPr/>
+        </p:nvSpPr>
+        <p:spPr>
+          <a:xfrm>
+            <a:off x="772560" y="392040"/>
+            <a:ext cx="960120" cy="199080"/>
+          </a:xfrm>
+          <a:custGeom>
+            <a:avLst/>
+            <a:gdLst>
+              <a:gd name="textAreaLeft" fmla="*/ 0 w 960120"/>
+              <a:gd name="textAreaRight" fmla="*/ 961920 w 960120"/>
+              <a:gd name="textAreaTop" fmla="*/ 0 h 199080"/>
+              <a:gd name="textAreaBottom" fmla="*/ 200880 h 199080"/>
+            </a:gdLst>
+            <a:ahLst/>
+            <a:cxnLst/>
+            <a:rect l="textAreaLeft" t="textAreaTop" r="textAreaRight" b="textAreaBottom"/>
+            <a:pathLst>
+              <a:path w="479" h="201">
+                <a:moveTo>
+                  <a:pt x="0" y="0"/>
+                </a:moveTo>
+                <a:lnTo>
+                  <a:pt x="478" y="0"/>
+                </a:lnTo>
+                <a:lnTo>
+                  <a:pt x="422" y="200"/>
+                </a:lnTo>
+                <a:lnTo>
+                  <a:pt x="0" y="200"/>
+                </a:lnTo>
+                <a:lnTo>
+                  <a:pt x="0" y="0"/>
+                </a:lnTo>
+              </a:path>
+            </a:pathLst>
+          </a:custGeom>
+          <a:solidFill>
+            <a:srgbClr val="ED7D31"/>
+          </a:solidFill>
+          <a:ln w="12600">
+            <a:noFill/>
+          </a:ln>
+        </p:spPr>
+        <p:style>
+          <a:lnRef idx="0">
+            <a:scrgbClr r="0" g="0" b="0"/>
+          </a:lnRef>
+          <a:fillRef idx="0">
+            <a:scrgbClr r="0" g="0" b="0"/>
+          </a:fillRef>
+          <a:effectRef idx="0">
+            <a:scrgbClr r="0" g="0" b="0"/>
+          </a:effectRef>
+          <a:fontRef idx="minor"/>
+        </p:style>
+        <p:txBody>
+          <a:bodyPr lIns="90000" tIns="45000" rIns="90000" bIns="45000" anchor="t">
+            <a:noAutofit/>
+          </a:bodyPr>
+          <a:lstStyle/>
+          <a:p>
+            <a:pPr defTabSz="914400">
+              <a:lnSpc>
+                <a:spcPct val="100000"/>
+              </a:lnSpc>
+            </a:pPr>
+            <a:endParaRPr lang="es-ES" sz="1800" b="0" strike="noStrike" spc="-1">
+              <a:solidFill>
+                <a:srgbClr val="000000"/>
+              </a:solidFill>
+              <a:latin typeface="Arial"/>
+              <a:ea typeface="DejaVu Sans"/>
+            </a:endParaRPr>
+          </a:p>
+        </p:txBody>
+      </p:sp>
+      <p:sp>
+        <p:nvSpPr>
+          <p:cNvPr id="87" name="CustomShape 111">
+            <a:extLst>
+              <a:ext uri="{FF2B5EF4-FFF2-40B4-BE49-F238E27FC236}">
+                <a16:creationId xmlns:a16="http://schemas.microsoft.com/office/drawing/2014/main" id="{95AA5AD4-7960-3C47-4971-EB778270DCCD}"/>
+              </a:ext>
+            </a:extLst>
+          </p:cNvPr>
+          <p:cNvSpPr/>
+          <p:nvPr/>
+        </p:nvSpPr>
+        <p:spPr>
+          <a:xfrm>
+            <a:off x="1704960" y="392040"/>
+            <a:ext cx="558360" cy="199080"/>
+          </a:xfrm>
+          <a:custGeom>
+            <a:avLst/>
+            <a:gdLst>
+              <a:gd name="textAreaLeft" fmla="*/ 0 w 558360"/>
+              <a:gd name="textAreaRight" fmla="*/ 560160 w 558360"/>
+              <a:gd name="textAreaTop" fmla="*/ 0 h 199080"/>
+              <a:gd name="textAreaBottom" fmla="*/ 200880 h 199080"/>
+            </a:gdLst>
+            <a:ahLst/>
+            <a:cxnLst/>
+            <a:rect l="textAreaLeft" t="textAreaTop" r="textAreaRight" b="textAreaBottom"/>
+            <a:pathLst>
+              <a:path w="282" h="201">
+                <a:moveTo>
+                  <a:pt x="56" y="0"/>
+                </a:moveTo>
+                <a:lnTo>
+                  <a:pt x="0" y="200"/>
+                </a:lnTo>
+                <a:lnTo>
+                  <a:pt x="225" y="200"/>
+                </a:lnTo>
+                <a:lnTo>
+                  <a:pt x="281" y="0"/>
+                </a:lnTo>
+                <a:lnTo>
+                  <a:pt x="56" y="0"/>
+                </a:lnTo>
+              </a:path>
+            </a:pathLst>
+          </a:custGeom>
+          <a:solidFill>
+            <a:srgbClr val="ED7D31"/>
+          </a:solidFill>
+          <a:ln w="12600">
+            <a:noFill/>
+          </a:ln>
+        </p:spPr>
+        <p:style>
+          <a:lnRef idx="0">
+            <a:scrgbClr r="0" g="0" b="0"/>
+          </a:lnRef>
+          <a:fillRef idx="0">
+            <a:scrgbClr r="0" g="0" b="0"/>
+          </a:fillRef>
+          <a:effectRef idx="0">
+            <a:scrgbClr r="0" g="0" b="0"/>
+          </a:effectRef>
+          <a:fontRef idx="minor"/>
+        </p:style>
+        <p:txBody>
+          <a:bodyPr lIns="90000" tIns="45000" rIns="90000" bIns="45000" anchor="t">
+            <a:noAutofit/>
+          </a:bodyPr>
+          <a:lstStyle/>
+          <a:p>
+            <a:pPr defTabSz="914400">
+              <a:lnSpc>
+                <a:spcPct val="100000"/>
+              </a:lnSpc>
+            </a:pPr>
+            <a:endParaRPr lang="es-ES" sz="1800" b="0" strike="noStrike" spc="-1">
+              <a:solidFill>
+                <a:srgbClr val="000000"/>
+              </a:solidFill>
+              <a:latin typeface="Arial"/>
+              <a:ea typeface="DejaVu Sans"/>
+            </a:endParaRPr>
+          </a:p>
+        </p:txBody>
+      </p:sp>
+      <p:sp>
+        <p:nvSpPr>
+          <p:cNvPr id="88" name="CustomShape 112">
+            <a:extLst>
+              <a:ext uri="{FF2B5EF4-FFF2-40B4-BE49-F238E27FC236}">
+                <a16:creationId xmlns:a16="http://schemas.microsoft.com/office/drawing/2014/main" id="{4FBB7707-E447-EF4F-F2F1-9427E5E5AB49}"/>
+              </a:ext>
+            </a:extLst>
+          </p:cNvPr>
+          <p:cNvSpPr/>
+          <p:nvPr/>
+        </p:nvSpPr>
+        <p:spPr>
+          <a:xfrm>
+            <a:off x="2227320" y="392040"/>
+            <a:ext cx="444240" cy="199080"/>
+          </a:xfrm>
+          <a:custGeom>
+            <a:avLst/>
+            <a:gdLst>
+              <a:gd name="textAreaLeft" fmla="*/ 0 w 444240"/>
+              <a:gd name="textAreaRight" fmla="*/ 446040 w 444240"/>
+              <a:gd name="textAreaTop" fmla="*/ 0 h 199080"/>
+              <a:gd name="textAreaBottom" fmla="*/ 200880 h 199080"/>
+            </a:gdLst>
+            <a:ahLst/>
+            <a:cxnLst/>
+            <a:rect l="textAreaLeft" t="textAreaTop" r="textAreaRight" b="textAreaBottom"/>
+            <a:pathLst>
+              <a:path w="226" h="201">
+                <a:moveTo>
+                  <a:pt x="56" y="0"/>
+                </a:moveTo>
+                <a:lnTo>
+                  <a:pt x="0" y="200"/>
+                </a:lnTo>
+                <a:lnTo>
+                  <a:pt x="169" y="200"/>
+                </a:lnTo>
+                <a:lnTo>
+                  <a:pt x="225" y="0"/>
+                </a:lnTo>
+                <a:lnTo>
+                  <a:pt x="56" y="0"/>
+                </a:lnTo>
+              </a:path>
+            </a:pathLst>
+          </a:custGeom>
+          <a:solidFill>
+            <a:srgbClr val="ED7D31">
+              <a:alpha val="80000"/>
+            </a:srgbClr>
+          </a:solidFill>
+          <a:ln w="12600">
+            <a:noFill/>
+          </a:ln>
+        </p:spPr>
+        <p:style>
+          <a:lnRef idx="0">
+            <a:scrgbClr r="0" g="0" b="0"/>
+          </a:lnRef>
+          <a:fillRef idx="0">
+            <a:scrgbClr r="0" g="0" b="0"/>
+          </a:fillRef>
+          <a:effectRef idx="0">
+            <a:scrgbClr r="0" g="0" b="0"/>
+          </a:effectRef>
+          <a:fontRef idx="minor"/>
+        </p:style>
+        <p:txBody>
+          <a:bodyPr lIns="90000" tIns="45000" rIns="90000" bIns="45000" anchor="t">
+            <a:noAutofit/>
+          </a:bodyPr>
+          <a:lstStyle/>
+          <a:p>
+            <a:pPr defTabSz="914400">
+              <a:lnSpc>
+                <a:spcPct val="100000"/>
+              </a:lnSpc>
+            </a:pPr>
+            <a:endParaRPr lang="es-ES" sz="1800" b="0" strike="noStrike" spc="-1">
+              <a:solidFill>
+                <a:srgbClr val="000000"/>
+              </a:solidFill>
+              <a:latin typeface="Arial"/>
+              <a:ea typeface="DejaVu Sans"/>
+            </a:endParaRPr>
+          </a:p>
+        </p:txBody>
+      </p:sp>
+      <p:sp>
+        <p:nvSpPr>
+          <p:cNvPr id="89" name="CustomShape 113">
+            <a:extLst>
+              <a:ext uri="{FF2B5EF4-FFF2-40B4-BE49-F238E27FC236}">
+                <a16:creationId xmlns:a16="http://schemas.microsoft.com/office/drawing/2014/main" id="{DE75BFAB-0634-C992-84B1-D2EE5C3968CF}"/>
+              </a:ext>
+            </a:extLst>
+          </p:cNvPr>
+          <p:cNvSpPr/>
+          <p:nvPr/>
+        </p:nvSpPr>
+        <p:spPr>
+          <a:xfrm>
+            <a:off x="2629080" y="392040"/>
+            <a:ext cx="329760" cy="199080"/>
+          </a:xfrm>
+          <a:custGeom>
+            <a:avLst/>
+            <a:gdLst>
+              <a:gd name="textAreaLeft" fmla="*/ 0 w 329760"/>
+              <a:gd name="textAreaRight" fmla="*/ 331560 w 329760"/>
+              <a:gd name="textAreaTop" fmla="*/ 0 h 199080"/>
+              <a:gd name="textAreaBottom" fmla="*/ 200880 h 199080"/>
+            </a:gdLst>
+            <a:ahLst/>
+            <a:cxnLst/>
+            <a:rect l="textAreaLeft" t="textAreaTop" r="textAreaRight" b="textAreaBottom"/>
+            <a:pathLst>
+              <a:path w="170" h="201">
+                <a:moveTo>
+                  <a:pt x="56" y="0"/>
+                </a:moveTo>
+                <a:lnTo>
+                  <a:pt x="0" y="200"/>
+                </a:lnTo>
+                <a:lnTo>
+                  <a:pt x="113" y="200"/>
+                </a:lnTo>
+                <a:lnTo>
+                  <a:pt x="169" y="0"/>
+                </a:lnTo>
+                <a:lnTo>
+                  <a:pt x="56" y="0"/>
+                </a:lnTo>
+              </a:path>
+            </a:pathLst>
+          </a:custGeom>
+          <a:solidFill>
+            <a:srgbClr val="ED7D31"/>
+          </a:solidFill>
+          <a:ln w="12600">
+            <a:noFill/>
+          </a:ln>
+        </p:spPr>
+        <p:style>
+          <a:lnRef idx="0">
+            <a:scrgbClr r="0" g="0" b="0"/>
+          </a:lnRef>
+          <a:fillRef idx="0">
+            <a:scrgbClr r="0" g="0" b="0"/>
+          </a:fillRef>
+          <a:effectRef idx="0">
+            <a:scrgbClr r="0" g="0" b="0"/>
+          </a:effectRef>
+          <a:fontRef idx="minor"/>
+        </p:style>
+        <p:txBody>
+          <a:bodyPr lIns="90000" tIns="45000" rIns="90000" bIns="45000" anchor="t">
+            <a:noAutofit/>
+          </a:bodyPr>
+          <a:lstStyle/>
+          <a:p>
+            <a:pPr defTabSz="914400">
+              <a:lnSpc>
+                <a:spcPct val="100000"/>
+              </a:lnSpc>
+            </a:pPr>
+            <a:endParaRPr lang="es-ES" sz="1800" b="0" strike="noStrike" spc="-1">
+              <a:solidFill>
+                <a:srgbClr val="000000"/>
+              </a:solidFill>
+              <a:latin typeface="Arial"/>
+              <a:ea typeface="DejaVu Sans"/>
+            </a:endParaRPr>
+          </a:p>
+        </p:txBody>
+      </p:sp>
+      <p:sp>
+        <p:nvSpPr>
+          <p:cNvPr id="90" name="CustomShape 114">
+            <a:extLst>
+              <a:ext uri="{FF2B5EF4-FFF2-40B4-BE49-F238E27FC236}">
+                <a16:creationId xmlns:a16="http://schemas.microsoft.com/office/drawing/2014/main" id="{89F4AEB2-FF4F-424B-EEFE-B02B86A184CE}"/>
+              </a:ext>
+            </a:extLst>
+          </p:cNvPr>
+          <p:cNvSpPr/>
+          <p:nvPr/>
+        </p:nvSpPr>
+        <p:spPr>
+          <a:xfrm>
+            <a:off x="2991240" y="392040"/>
+            <a:ext cx="213480" cy="199080"/>
+          </a:xfrm>
+          <a:custGeom>
+            <a:avLst/>
+            <a:gdLst>
+              <a:gd name="textAreaLeft" fmla="*/ 0 w 213480"/>
+              <a:gd name="textAreaRight" fmla="*/ 215280 w 213480"/>
+              <a:gd name="textAreaTop" fmla="*/ 0 h 199080"/>
+              <a:gd name="textAreaBottom" fmla="*/ 200880 h 199080"/>
+            </a:gdLst>
+            <a:ahLst/>
+            <a:cxnLst/>
+            <a:rect l="textAreaLeft" t="textAreaTop" r="textAreaRight" b="textAreaBottom"/>
+            <a:pathLst>
+              <a:path w="113" h="201">
+                <a:moveTo>
+                  <a:pt x="56" y="0"/>
+                </a:moveTo>
+                <a:lnTo>
+                  <a:pt x="0" y="200"/>
+                </a:lnTo>
+                <a:lnTo>
+                  <a:pt x="56" y="200"/>
+                </a:lnTo>
+                <a:lnTo>
+                  <a:pt x="112" y="0"/>
+                </a:lnTo>
+                <a:lnTo>
+                  <a:pt x="56" y="0"/>
+                </a:lnTo>
+              </a:path>
+            </a:pathLst>
+          </a:custGeom>
+          <a:solidFill>
+            <a:srgbClr val="ED7D31"/>
+          </a:solidFill>
+          <a:ln w="12600">
+            <a:noFill/>
+          </a:ln>
+        </p:spPr>
+        <p:style>
+          <a:lnRef idx="0">
+            <a:scrgbClr r="0" g="0" b="0"/>
+          </a:lnRef>
+          <a:fillRef idx="0">
+            <a:scrgbClr r="0" g="0" b="0"/>
+          </a:fillRef>
+          <a:effectRef idx="0">
+            <a:scrgbClr r="0" g="0" b="0"/>
+          </a:effectRef>
+          <a:fontRef idx="minor"/>
+        </p:style>
+        <p:txBody>
+          <a:bodyPr lIns="90000" tIns="45000" rIns="90000" bIns="45000" anchor="t">
+            <a:noAutofit/>
+          </a:bodyPr>
+          <a:lstStyle/>
+          <a:p>
+            <a:pPr defTabSz="914400">
+              <a:lnSpc>
+                <a:spcPct val="100000"/>
+              </a:lnSpc>
+            </a:pPr>
+            <a:endParaRPr lang="es-ES" sz="1800" b="0" strike="noStrike" spc="-1">
+              <a:solidFill>
+                <a:srgbClr val="000000"/>
+              </a:solidFill>
+              <a:latin typeface="Arial"/>
+              <a:ea typeface="DejaVu Sans"/>
+            </a:endParaRPr>
+          </a:p>
+        </p:txBody>
+      </p:sp>
+      <p:sp>
+        <p:nvSpPr>
+          <p:cNvPr id="91" name="CustomShape 115">
+            <a:extLst>
+              <a:ext uri="{FF2B5EF4-FFF2-40B4-BE49-F238E27FC236}">
+                <a16:creationId xmlns:a16="http://schemas.microsoft.com/office/drawing/2014/main" id="{71308AC0-633F-9ED5-D426-1FC4DD74B429}"/>
+              </a:ext>
+            </a:extLst>
+          </p:cNvPr>
+          <p:cNvSpPr/>
+          <p:nvPr/>
+        </p:nvSpPr>
+        <p:spPr>
+          <a:xfrm>
+            <a:off x="2912040" y="392040"/>
+            <a:ext cx="136080" cy="199080"/>
+          </a:xfrm>
+          <a:custGeom>
+            <a:avLst/>
+            <a:gdLst>
+              <a:gd name="textAreaLeft" fmla="*/ 0 w 136080"/>
+              <a:gd name="textAreaRight" fmla="*/ 137880 w 136080"/>
+              <a:gd name="textAreaTop" fmla="*/ 0 h 199080"/>
+              <a:gd name="textAreaBottom" fmla="*/ 200880 h 199080"/>
+            </a:gdLst>
+            <a:ahLst/>
+            <a:cxnLst/>
+            <a:rect l="textAreaLeft" t="textAreaTop" r="textAreaRight" b="textAreaBottom"/>
+            <a:pathLst>
+              <a:path w="75" h="201">
+                <a:moveTo>
+                  <a:pt x="56" y="0"/>
+                </a:moveTo>
+                <a:lnTo>
+                  <a:pt x="0" y="200"/>
+                </a:lnTo>
+                <a:lnTo>
+                  <a:pt x="18" y="200"/>
+                </a:lnTo>
+                <a:lnTo>
+                  <a:pt x="74" y="0"/>
+                </a:lnTo>
+                <a:lnTo>
+                  <a:pt x="56" y="0"/>
+                </a:lnTo>
+              </a:path>
+            </a:pathLst>
+          </a:custGeom>
+          <a:solidFill>
+            <a:srgbClr val="ED7D31"/>
+          </a:solidFill>
+          <a:ln w="12600">
+            <a:noFill/>
+          </a:ln>
+        </p:spPr>
+        <p:style>
+          <a:lnRef idx="0">
+            <a:scrgbClr r="0" g="0" b="0"/>
+          </a:lnRef>
+          <a:fillRef idx="0">
+            <a:scrgbClr r="0" g="0" b="0"/>
+          </a:fillRef>
+          <a:effectRef idx="0">
+            <a:scrgbClr r="0" g="0" b="0"/>
+          </a:effectRef>
+          <a:fontRef idx="minor"/>
+        </p:style>
+        <p:txBody>
+          <a:bodyPr lIns="90000" tIns="45000" rIns="90000" bIns="45000" anchor="t">
+            <a:noAutofit/>
+          </a:bodyPr>
+          <a:lstStyle/>
+          <a:p>
+            <a:pPr defTabSz="914400">
+              <a:lnSpc>
+                <a:spcPct val="100000"/>
+              </a:lnSpc>
+            </a:pPr>
+            <a:endParaRPr lang="es-ES" sz="1800" b="0" strike="noStrike" spc="-1">
+              <a:solidFill>
+                <a:srgbClr val="000000"/>
+              </a:solidFill>
+              <a:latin typeface="Arial"/>
+              <a:ea typeface="DejaVu Sans"/>
+            </a:endParaRPr>
+          </a:p>
+        </p:txBody>
+      </p:sp>
+      <p:sp>
+        <p:nvSpPr>
+          <p:cNvPr id="92" name="CustomShape 116">
+            <a:extLst>
+              <a:ext uri="{FF2B5EF4-FFF2-40B4-BE49-F238E27FC236}">
+                <a16:creationId xmlns:a16="http://schemas.microsoft.com/office/drawing/2014/main" id="{E872F63D-2D1F-DE5D-0987-2440BA5C1D3E}"/>
+              </a:ext>
+            </a:extLst>
+          </p:cNvPr>
+          <p:cNvSpPr/>
+          <p:nvPr/>
+        </p:nvSpPr>
+        <p:spPr>
+          <a:xfrm>
+            <a:off x="3492360" y="6585120"/>
+            <a:ext cx="7161840" cy="60840"/>
+          </a:xfrm>
+          <a:custGeom>
+            <a:avLst/>
+            <a:gdLst>
+              <a:gd name="textAreaLeft" fmla="*/ 0 w 7161840"/>
+              <a:gd name="textAreaRight" fmla="*/ 7163640 w 7161840"/>
+              <a:gd name="textAreaTop" fmla="*/ 0 h 60840"/>
+              <a:gd name="textAreaBottom" fmla="*/ 62640 h 60840"/>
+            </a:gdLst>
+            <a:ahLst/>
+            <a:cxnLst/>
+            <a:rect l="textAreaLeft" t="textAreaTop" r="textAreaRight" b="textAreaBottom"/>
+            <a:pathLst>
+              <a:path w="5288" h="49">
+                <a:moveTo>
+                  <a:pt x="0" y="48"/>
+                </a:moveTo>
+                <a:lnTo>
+                  <a:pt x="5287" y="48"/>
+                </a:lnTo>
+                <a:lnTo>
+                  <a:pt x="5287" y="0"/>
+                </a:lnTo>
+                <a:lnTo>
+                  <a:pt x="14" y="0"/>
+                </a:lnTo>
+                <a:lnTo>
+                  <a:pt x="0" y="48"/>
+                </a:lnTo>
+              </a:path>
+            </a:pathLst>
+          </a:custGeom>
+          <a:solidFill>
+            <a:srgbClr val="ED7D31"/>
+          </a:solidFill>
+          <a:ln w="12600">
+            <a:noFill/>
+          </a:ln>
+        </p:spPr>
+        <p:style>
+          <a:lnRef idx="0">
+            <a:scrgbClr r="0" g="0" b="0"/>
+          </a:lnRef>
+          <a:fillRef idx="0">
+            <a:scrgbClr r="0" g="0" b="0"/>
+          </a:fillRef>
+          <a:effectRef idx="0">
+            <a:scrgbClr r="0" g="0" b="0"/>
+          </a:effectRef>
+          <a:fontRef idx="minor"/>
+        </p:style>
+        <p:txBody>
+          <a:bodyPr lIns="90000" tIns="17640" rIns="90000" bIns="17640" anchor="t">
+            <a:noAutofit/>
+          </a:bodyPr>
+          <a:lstStyle/>
+          <a:p>
+            <a:pPr defTabSz="914400">
+              <a:lnSpc>
+                <a:spcPct val="100000"/>
+              </a:lnSpc>
+            </a:pPr>
+            <a:endParaRPr lang="es-ES" sz="1800" b="0" strike="noStrike" spc="-1">
+              <a:solidFill>
+                <a:srgbClr val="000000"/>
+              </a:solidFill>
+              <a:latin typeface="Arial"/>
+              <a:ea typeface="DejaVu Sans"/>
+            </a:endParaRPr>
+          </a:p>
+        </p:txBody>
+      </p:sp>
+      <p:sp>
+        <p:nvSpPr>
+          <p:cNvPr id="93" name="CustomShape 117">
+            <a:extLst>
+              <a:ext uri="{FF2B5EF4-FFF2-40B4-BE49-F238E27FC236}">
+                <a16:creationId xmlns:a16="http://schemas.microsoft.com/office/drawing/2014/main" id="{15A9C605-50E5-EDA1-10A3-DAB21943EF44}"/>
+              </a:ext>
+            </a:extLst>
+          </p:cNvPr>
+          <p:cNvSpPr/>
+          <p:nvPr/>
+        </p:nvSpPr>
+        <p:spPr>
+          <a:xfrm>
+            <a:off x="3917520" y="260640"/>
+            <a:ext cx="6463080" cy="549720"/>
+          </a:xfrm>
+          <a:prstGeom prst="rect">
+            <a:avLst/>
+          </a:prstGeom>
+          <a:noFill/>
+          <a:ln w="12600">
+            <a:noFill/>
+          </a:ln>
+        </p:spPr>
+        <p:style>
+          <a:lnRef idx="0">
+            <a:scrgbClr r="0" g="0" b="0"/>
+          </a:lnRef>
+          <a:fillRef idx="0">
+            <a:scrgbClr r="0" g="0" b="0"/>
+          </a:fillRef>
+          <a:effectRef idx="0">
+            <a:scrgbClr r="0" g="0" b="0"/>
+          </a:effectRef>
+          <a:fontRef idx="minor"/>
+        </p:style>
+        <p:txBody>
+          <a:bodyPr lIns="90000" tIns="45000" rIns="90000" bIns="45000" anchor="t">
+            <a:noAutofit/>
+          </a:bodyPr>
+          <a:lstStyle/>
+          <a:p>
+            <a:pPr defTabSz="914400">
+              <a:lnSpc>
+                <a:spcPct val="100000"/>
+              </a:lnSpc>
+            </a:pPr>
+            <a:endParaRPr lang="es-ES" sz="1800" b="0" strike="noStrike" spc="-1">
+              <a:solidFill>
+                <a:srgbClr val="000000"/>
+              </a:solidFill>
+              <a:latin typeface="Arial"/>
+              <a:ea typeface="DejaVu Sans"/>
+            </a:endParaRPr>
+          </a:p>
+        </p:txBody>
+      </p:sp>
+      <p:sp>
+        <p:nvSpPr>
+          <p:cNvPr id="94" name="CustomShape 118">
+            <a:extLst>
+              <a:ext uri="{FF2B5EF4-FFF2-40B4-BE49-F238E27FC236}">
+                <a16:creationId xmlns:a16="http://schemas.microsoft.com/office/drawing/2014/main" id="{97045B20-321C-48E1-5438-1D17D42519AB}"/>
+              </a:ext>
+            </a:extLst>
+          </p:cNvPr>
+          <p:cNvSpPr/>
+          <p:nvPr/>
+        </p:nvSpPr>
+        <p:spPr>
+          <a:xfrm>
+            <a:off x="3917520" y="260640"/>
+            <a:ext cx="5238360" cy="410760"/>
+          </a:xfrm>
+          <a:prstGeom prst="rect">
+            <a:avLst/>
+          </a:prstGeom>
+          <a:noFill/>
+          <a:ln w="0">
+            <a:noFill/>
+          </a:ln>
+        </p:spPr>
+        <p:style>
+          <a:lnRef idx="0">
+            <a:scrgbClr r="0" g="0" b="0"/>
+          </a:lnRef>
+          <a:fillRef idx="0">
+            <a:scrgbClr r="0" g="0" b="0"/>
+          </a:fillRef>
+          <a:effectRef idx="0">
+            <a:scrgbClr r="0" g="0" b="0"/>
+          </a:effectRef>
+          <a:fontRef idx="minor"/>
+        </p:style>
+        <p:txBody>
+          <a:bodyPr lIns="90000" tIns="45000" rIns="90000" bIns="45000" anchor="t">
+            <a:noAutofit/>
+          </a:bodyPr>
+          <a:lstStyle/>
+          <a:p>
+            <a:pPr defTabSz="914400">
+              <a:lnSpc>
+                <a:spcPct val="100000"/>
+              </a:lnSpc>
+            </a:pPr>
+            <a:r>
+              <a:rPr lang="es-ES" sz="2600" b="1" strike="noStrike" spc="-1" dirty="0">
+                <a:solidFill>
+                  <a:srgbClr val="000000"/>
+                </a:solidFill>
+                <a:latin typeface="Arial"/>
+                <a:ea typeface="DejaVu Sans"/>
+              </a:rPr>
+              <a:t>PROPUESTA SPRINT 02</a:t>
+            </a:r>
+            <a:endParaRPr lang="es-ES" sz="2600" b="0" strike="noStrike" spc="-1" dirty="0">
+              <a:solidFill>
+                <a:srgbClr val="000000"/>
+              </a:solidFill>
+              <a:latin typeface="Arial"/>
+            </a:endParaRPr>
+          </a:p>
+        </p:txBody>
+      </p:sp>
+      <p:pic>
+        <p:nvPicPr>
+          <p:cNvPr id="95" name="Imagen 24">
+            <a:extLst>
+              <a:ext uri="{FF2B5EF4-FFF2-40B4-BE49-F238E27FC236}">
+                <a16:creationId xmlns:a16="http://schemas.microsoft.com/office/drawing/2014/main" id="{5BEB12EB-EBB3-B2C5-FD70-A9F0B7E252E8}"/>
+              </a:ext>
+            </a:extLst>
+          </p:cNvPr>
+          <p:cNvPicPr/>
+          <p:nvPr/>
+        </p:nvPicPr>
+        <p:blipFill>
+          <a:blip r:embed="rId3"/>
+          <a:stretch/>
+        </p:blipFill>
+        <p:spPr>
+          <a:xfrm>
+            <a:off x="87480" y="51480"/>
+            <a:ext cx="713880" cy="828720"/>
+          </a:xfrm>
+          <a:prstGeom prst="rect">
+            <a:avLst/>
+          </a:prstGeom>
+          <a:ln w="0">
+            <a:noFill/>
+          </a:ln>
+        </p:spPr>
+      </p:pic>
+      <p:pic>
+        <p:nvPicPr>
+          <p:cNvPr id="96" name="Imagen 25">
+            <a:extLst>
+              <a:ext uri="{FF2B5EF4-FFF2-40B4-BE49-F238E27FC236}">
+                <a16:creationId xmlns:a16="http://schemas.microsoft.com/office/drawing/2014/main" id="{5E01D214-52BB-F1BB-013C-F53BE8259543}"/>
+              </a:ext>
+            </a:extLst>
+          </p:cNvPr>
+          <p:cNvPicPr/>
+          <p:nvPr/>
+        </p:nvPicPr>
+        <p:blipFill>
+          <a:blip r:embed="rId4"/>
+          <a:stretch/>
+        </p:blipFill>
+        <p:spPr>
+          <a:xfrm>
+            <a:off x="11378520" y="16200"/>
+            <a:ext cx="713880" cy="1038600"/>
+          </a:xfrm>
+          <a:prstGeom prst="rect">
+            <a:avLst/>
+          </a:prstGeom>
+          <a:ln w="0">
+            <a:noFill/>
+          </a:ln>
+        </p:spPr>
+      </p:pic>
+      <p:sp>
+        <p:nvSpPr>
+          <p:cNvPr id="4" name="CuadroTexto 3">
+            <a:extLst>
+              <a:ext uri="{FF2B5EF4-FFF2-40B4-BE49-F238E27FC236}">
+                <a16:creationId xmlns:a16="http://schemas.microsoft.com/office/drawing/2014/main" id="{A09A0F42-A06F-5A47-0912-757E0E75A637}"/>
+              </a:ext>
+            </a:extLst>
+          </p:cNvPr>
+          <p:cNvSpPr txBox="1"/>
+          <p:nvPr/>
+        </p:nvSpPr>
+        <p:spPr>
+          <a:xfrm>
+            <a:off x="624480" y="1310400"/>
+            <a:ext cx="10809960" cy="4305730"/>
+          </a:xfrm>
+          <a:prstGeom prst="rect">
+            <a:avLst/>
+          </a:prstGeom>
+          <a:noFill/>
+        </p:spPr>
+        <p:txBody>
+          <a:bodyPr wrap="square">
+            <a:spAutoFit/>
+          </a:bodyPr>
+          <a:lstStyle/>
+          <a:p>
+            <a:pPr indent="288290" algn="just">
+              <a:lnSpc>
+                <a:spcPct val="150000"/>
+              </a:lnSpc>
+              <a:spcBef>
+                <a:spcPts val="900"/>
+              </a:spcBef>
+              <a:spcAft>
+                <a:spcPts val="900"/>
+              </a:spcAft>
+            </a:pPr>
+            <a:r>
+              <a:rPr lang="es-ES" sz="2000" b="1" dirty="0">
+                <a:effectLst/>
+                <a:latin typeface="Arial" panose="020B0604020202020204" pitchFamily="34" charset="0"/>
+                <a:ea typeface="Times New Roman" panose="02020603050405020304" pitchFamily="18" charset="0"/>
+                <a:cs typeface="Times New Roman" panose="02020603050405020304" pitchFamily="18" charset="0"/>
+              </a:rPr>
+              <a:t>SPRINT GOAL: </a:t>
+            </a:r>
+            <a:r>
+              <a:rPr lang="es-ES" sz="2000" dirty="0">
+                <a:effectLst/>
+                <a:latin typeface="Arial" panose="020B0604020202020204" pitchFamily="34" charset="0"/>
+                <a:ea typeface="Times New Roman" panose="02020603050405020304" pitchFamily="18" charset="0"/>
+                <a:cs typeface="Times New Roman" panose="02020603050405020304" pitchFamily="18" charset="0"/>
+              </a:rPr>
+              <a:t>Gestionar el ciclo completo </a:t>
+            </a:r>
+            <a:r>
+              <a:rPr lang="es-ES" sz="2000" dirty="0">
+                <a:latin typeface="Arial" panose="020B0604020202020204" pitchFamily="34" charset="0"/>
+                <a:ea typeface="Times New Roman" panose="02020603050405020304" pitchFamily="18" charset="0"/>
+                <a:cs typeface="Times New Roman" panose="02020603050405020304" pitchFamily="18" charset="0"/>
+              </a:rPr>
+              <a:t>alta y edición de </a:t>
+            </a:r>
+            <a:r>
+              <a:rPr lang="es-ES" sz="2000" b="1" dirty="0">
+                <a:solidFill>
+                  <a:srgbClr val="0070C0"/>
+                </a:solidFill>
+                <a:latin typeface="Arial" panose="020B0604020202020204" pitchFamily="34" charset="0"/>
+                <a:ea typeface="Times New Roman" panose="02020603050405020304" pitchFamily="18" charset="0"/>
+                <a:cs typeface="Times New Roman" panose="02020603050405020304" pitchFamily="18" charset="0"/>
+              </a:rPr>
+              <a:t>suscripciones</a:t>
+            </a:r>
+            <a:r>
+              <a:rPr lang="es-ES" sz="2000" dirty="0">
+                <a:latin typeface="Arial" panose="020B0604020202020204" pitchFamily="34" charset="0"/>
+                <a:ea typeface="Times New Roman" panose="02020603050405020304" pitchFamily="18" charset="0"/>
+                <a:cs typeface="Times New Roman" panose="02020603050405020304" pitchFamily="18" charset="0"/>
+              </a:rPr>
+              <a:t> y </a:t>
+            </a:r>
+            <a:r>
+              <a:rPr lang="es-ES" sz="2000" b="1" dirty="0">
+                <a:solidFill>
+                  <a:srgbClr val="0070C0"/>
+                </a:solidFill>
+                <a:latin typeface="Arial" panose="020B0604020202020204" pitchFamily="34" charset="0"/>
+                <a:ea typeface="Times New Roman" panose="02020603050405020304" pitchFamily="18" charset="0"/>
+                <a:cs typeface="Times New Roman" panose="02020603050405020304" pitchFamily="18" charset="0"/>
+              </a:rPr>
+              <a:t>suscriptores</a:t>
+            </a:r>
+            <a:r>
+              <a:rPr lang="es-ES" sz="2000" dirty="0">
+                <a:effectLst/>
+                <a:latin typeface="Arial" panose="020B0604020202020204" pitchFamily="34" charset="0"/>
+                <a:ea typeface="Times New Roman" panose="02020603050405020304" pitchFamily="18" charset="0"/>
+                <a:cs typeface="Times New Roman" panose="02020603050405020304" pitchFamily="18" charset="0"/>
+              </a:rPr>
+              <a:t>.</a:t>
+            </a:r>
+          </a:p>
+          <a:p>
+            <a:pPr marL="800100" lvl="1" indent="-342900" algn="just">
+              <a:lnSpc>
+                <a:spcPct val="150000"/>
+              </a:lnSpc>
+              <a:spcBef>
+                <a:spcPts val="900"/>
+              </a:spcBef>
+              <a:buFont typeface="Symbol" panose="05050102010706020507" pitchFamily="18" charset="2"/>
+              <a:buChar char=""/>
+            </a:pPr>
+            <a:r>
+              <a:rPr lang="es-ES" sz="2000" dirty="0">
+                <a:effectLst/>
+                <a:latin typeface="Arial" panose="020B0604020202020204" pitchFamily="34" charset="0"/>
+                <a:ea typeface="Times New Roman" panose="02020603050405020304" pitchFamily="18" charset="0"/>
+                <a:cs typeface="Times New Roman" panose="02020603050405020304" pitchFamily="18" charset="0"/>
+              </a:rPr>
+              <a:t>Gestionar suscripciones (alta, edición y baja).</a:t>
+            </a:r>
+          </a:p>
+          <a:p>
+            <a:pPr marL="800100" lvl="1" indent="-342900" algn="just">
+              <a:lnSpc>
+                <a:spcPct val="150000"/>
+              </a:lnSpc>
+              <a:buFont typeface="Symbol" panose="05050102010706020507" pitchFamily="18" charset="2"/>
+              <a:buChar char=""/>
+            </a:pPr>
+            <a:r>
+              <a:rPr lang="es-ES" sz="2000" dirty="0">
+                <a:effectLst/>
+                <a:latin typeface="Arial" panose="020B0604020202020204" pitchFamily="34" charset="0"/>
+                <a:ea typeface="Times New Roman" panose="02020603050405020304" pitchFamily="18" charset="0"/>
+                <a:cs typeface="Times New Roman" panose="02020603050405020304" pitchFamily="18" charset="0"/>
+              </a:rPr>
+              <a:t>Registrar y gestionar suscriptores, junto con sus datos asociados.</a:t>
+            </a:r>
+          </a:p>
+          <a:p>
+            <a:pPr marL="800100" lvl="1" indent="-342900" algn="just">
+              <a:lnSpc>
+                <a:spcPct val="150000"/>
+              </a:lnSpc>
+              <a:spcAft>
+                <a:spcPts val="900"/>
+              </a:spcAft>
+              <a:buFont typeface="Symbol" panose="05050102010706020507" pitchFamily="18" charset="2"/>
+              <a:buChar char=""/>
+            </a:pPr>
+            <a:r>
+              <a:rPr lang="es-ES" sz="2000" dirty="0">
+                <a:effectLst/>
+                <a:latin typeface="Arial" panose="020B0604020202020204" pitchFamily="34" charset="0"/>
+                <a:ea typeface="Times New Roman" panose="02020603050405020304" pitchFamily="18" charset="0"/>
+                <a:cs typeface="Times New Roman" panose="02020603050405020304" pitchFamily="18" charset="0"/>
+              </a:rPr>
+              <a:t>Etiquetas de envío de ejemplares físicos a los suscriptores</a:t>
+            </a:r>
+          </a:p>
+          <a:p>
+            <a:pPr marL="800100" lvl="1" indent="-342900" algn="just">
+              <a:lnSpc>
+                <a:spcPct val="150000"/>
+              </a:lnSpc>
+              <a:spcAft>
+                <a:spcPts val="900"/>
+              </a:spcAft>
+              <a:buFont typeface="Symbol" panose="05050102010706020507" pitchFamily="18" charset="2"/>
+              <a:buChar char=""/>
+            </a:pPr>
+            <a:r>
+              <a:rPr lang="es-ES" sz="2000" dirty="0">
+                <a:latin typeface="Arial" panose="020B0604020202020204" pitchFamily="34" charset="0"/>
+                <a:ea typeface="Times New Roman" panose="02020603050405020304" pitchFamily="18" charset="0"/>
+                <a:cs typeface="Times New Roman" panose="02020603050405020304" pitchFamily="18" charset="0"/>
+              </a:rPr>
+              <a:t>Emisión de certificados de pago a autores</a:t>
+            </a:r>
+            <a:r>
+              <a:rPr lang="es-ES" sz="2000" dirty="0">
+                <a:effectLst/>
+                <a:latin typeface="Arial" panose="020B0604020202020204" pitchFamily="34" charset="0"/>
+                <a:ea typeface="Times New Roman" panose="02020603050405020304" pitchFamily="18" charset="0"/>
+                <a:cs typeface="Times New Roman" panose="02020603050405020304" pitchFamily="18" charset="0"/>
+              </a:rPr>
+              <a:t>.</a:t>
+            </a:r>
+          </a:p>
+          <a:p>
+            <a:pPr indent="288290" algn="just">
+              <a:lnSpc>
+                <a:spcPct val="150000"/>
+              </a:lnSpc>
+              <a:spcBef>
+                <a:spcPts val="900"/>
+              </a:spcBef>
+              <a:spcAft>
+                <a:spcPts val="900"/>
+              </a:spcAft>
+              <a:buNone/>
+            </a:pPr>
+            <a:r>
+              <a:rPr lang="es-ES" sz="2000" dirty="0">
+                <a:effectLst/>
+                <a:latin typeface="Arial" panose="020B0604020202020204" pitchFamily="34" charset="0"/>
+                <a:ea typeface="Times New Roman" panose="02020603050405020304" pitchFamily="18" charset="0"/>
+                <a:cs typeface="Times New Roman" panose="02020603050405020304" pitchFamily="18" charset="0"/>
+              </a:rPr>
+              <a:t>Este objetivo para el Sprint 02, contribuye al alcanzar el objetivo del </a:t>
+            </a:r>
+            <a:r>
+              <a:rPr lang="es-ES" sz="2000" dirty="0" err="1">
+                <a:effectLst/>
+                <a:latin typeface="Arial" panose="020B0604020202020204" pitchFamily="34" charset="0"/>
+                <a:ea typeface="Times New Roman" panose="02020603050405020304" pitchFamily="18" charset="0"/>
+                <a:cs typeface="Times New Roman" panose="02020603050405020304" pitchFamily="18" charset="0"/>
+              </a:rPr>
+              <a:t>Impact</a:t>
+            </a:r>
+            <a:r>
+              <a:rPr lang="es-ES" sz="2000" dirty="0">
+                <a:effectLst/>
+                <a:latin typeface="Arial" panose="020B0604020202020204" pitchFamily="34" charset="0"/>
+                <a:ea typeface="Times New Roman" panose="02020603050405020304" pitchFamily="18" charset="0"/>
+                <a:cs typeface="Times New Roman" panose="02020603050405020304" pitchFamily="18" charset="0"/>
+              </a:rPr>
+              <a:t> </a:t>
+            </a:r>
+            <a:r>
+              <a:rPr lang="es-ES" sz="2000" dirty="0" err="1">
+                <a:effectLst/>
+                <a:latin typeface="Arial" panose="020B0604020202020204" pitchFamily="34" charset="0"/>
+                <a:ea typeface="Times New Roman" panose="02020603050405020304" pitchFamily="18" charset="0"/>
+                <a:cs typeface="Times New Roman" panose="02020603050405020304" pitchFamily="18" charset="0"/>
+              </a:rPr>
+              <a:t>Map</a:t>
+            </a:r>
+            <a:r>
+              <a:rPr lang="es-ES" sz="2000" dirty="0">
+                <a:effectLst/>
+                <a:latin typeface="Arial" panose="020B0604020202020204" pitchFamily="34" charset="0"/>
+                <a:ea typeface="Times New Roman" panose="02020603050405020304" pitchFamily="18" charset="0"/>
+                <a:cs typeface="Times New Roman" panose="02020603050405020304" pitchFamily="18" charset="0"/>
+              </a:rPr>
+              <a:t>, manteniendo la continuidad de negocio.</a:t>
+            </a:r>
+          </a:p>
+        </p:txBody>
+      </p:sp>
+    </p:spTree>
+    <p:extLst>
+      <p:ext uri="{BB962C8B-B14F-4D97-AF65-F5344CB8AC3E}">
+        <p14:creationId xmlns:p14="http://schemas.microsoft.com/office/powerpoint/2010/main" val="4103938155"/>
+      </p:ext>
+    </p:extLst>
+  </p:cSld>
+  <p:clrMapOvr>
+    <a:masterClrMapping/>
+  </p:clrMapOvr>
+</p:sld>
+</file>
+
+<file path=ppt/slides/slide12.xml><?xml version="1.0" encoding="utf-8"?>
+<p:sld xmlns:a="http://schemas.openxmlformats.org/drawingml/2006/main" xmlns:r="http://schemas.openxmlformats.org/officeDocument/2006/relationships" xmlns:p="http://schemas.openxmlformats.org/presentationml/2006/main">
+  <p:cSld>
+    <p:bg>
+      <p:bgPr>
+        <a:solidFill>
+          <a:schemeClr val="lt1"/>
+        </a:solidFill>
+        <a:effectLst/>
+      </p:bgPr>
+    </p:bg>
+    <p:spTree>
+      <p:nvGrpSpPr>
+        <p:cNvPr id="1" name="">
+          <a:extLst>
+            <a:ext uri="{FF2B5EF4-FFF2-40B4-BE49-F238E27FC236}">
               <a16:creationId xmlns:a16="http://schemas.microsoft.com/office/drawing/2014/main" id="{46AF10DE-182F-FCAC-BC5F-51CE6EABB9A3}"/>
             </a:ext>
           </a:extLst>
@@ -9960,7 +11211,7 @@
 </p:sld>
 </file>
 
-<file path=ppt/slides/slide12.xml><?xml version="1.0" encoding="utf-8"?>
+<file path=ppt/slides/slide13.xml><?xml version="1.0" encoding="utf-8"?>
 <p:sld xmlns:a="http://schemas.openxmlformats.org/drawingml/2006/main" xmlns:r="http://schemas.openxmlformats.org/officeDocument/2006/relationships" xmlns:p="http://schemas.openxmlformats.org/presentationml/2006/main">
   <p:cSld>
     <p:bg>
@@ -11521,6 +12772,18 @@
             </a:endParaRPr>
           </a:p>
           <a:p>
+            <a:r>
+              <a:rPr lang="es-ES" sz="2400" spc="-1" dirty="0">
+                <a:solidFill>
+                  <a:srgbClr val="000000"/>
+                </a:solidFill>
+                <a:latin typeface="Arial"/>
+                <a:ea typeface="DejaVu Sans"/>
+              </a:rPr>
+              <a:t>	- Propuesta Sprint 02</a:t>
+            </a:r>
+          </a:p>
+          <a:p>
             <a:pPr defTabSz="914400">
               <a:lnSpc>
                 <a:spcPct val="100000"/>
@@ -12432,7 +13695,28 @@
                 <a:ea typeface="Times New Roman" panose="02020603050405020304" pitchFamily="18" charset="0"/>
                 <a:cs typeface="Times New Roman" panose="02020603050405020304" pitchFamily="18" charset="0"/>
               </a:rPr>
-              <a:t>Gestionar el ciclo completo de creación, evaluación y agrupación de artículos hasta su asignación a un número de revista.</a:t>
+              <a:t>Gestionar el ciclo completo de creación, evaluación y agrupación de </a:t>
+            </a:r>
+            <a:r>
+              <a:rPr lang="es-ES" sz="2000" b="1" dirty="0">
+                <a:solidFill>
+                  <a:srgbClr val="0070C0"/>
+                </a:solidFill>
+                <a:effectLst/>
+                <a:latin typeface="Arial" panose="020B0604020202020204" pitchFamily="34" charset="0"/>
+                <a:ea typeface="Times New Roman" panose="02020603050405020304" pitchFamily="18" charset="0"/>
+                <a:cs typeface="Times New Roman" panose="02020603050405020304" pitchFamily="18" charset="0"/>
+              </a:rPr>
+              <a:t>artículos</a:t>
+            </a:r>
+            <a:r>
+              <a:rPr lang="es-ES" sz="2000" dirty="0">
+                <a:effectLst/>
+                <a:latin typeface="Arial" panose="020B0604020202020204" pitchFamily="34" charset="0"/>
+                <a:ea typeface="Times New Roman" panose="02020603050405020304" pitchFamily="18" charset="0"/>
+                <a:cs typeface="Times New Roman" panose="02020603050405020304" pitchFamily="18" charset="0"/>
+              </a:rPr>
+              <a:t> hasta su asignación a un número de revista.</a:t>
             </a:r>
           </a:p>
           <a:p>
@@ -12453,17 +13737,20 @@
                 <a:ea typeface="Times New Roman" panose="02020603050405020304" pitchFamily="18" charset="0"/>
                 <a:cs typeface="Times New Roman" panose="02020603050405020304" pitchFamily="18" charset="0"/>
               </a:rPr>
-              <a:t>Gestionar Autores y su información asociada (datos, documentos y perfil militar)</a:t>
+              <a:t>Gestionar </a:t>
             </a:r>
-          </a:p>
-          <a:p>
-            <a:pPr marL="800100" lvl="1" indent="-342900" algn="just">
-              <a:lnSpc>
-                <a:spcPct val="150000"/>
-              </a:lnSpc>
-              <a:buFont typeface="Symbol" panose="05050102010706020507" pitchFamily="18" charset="2"/>
-              <a:buChar char=""/>
-            </a:pPr>
+            <a:r>
+              <a:rPr lang="es-ES" sz="2000" b="1" dirty="0">
+                <a:solidFill>
+                  <a:srgbClr val="0070C0"/>
+                </a:solidFill>
+                <a:effectLst/>
+                <a:latin typeface="Arial" panose="020B0604020202020204" pitchFamily="34" charset="0"/>
+                <a:ea typeface="Times New Roman" panose="02020603050405020304" pitchFamily="18" charset="0"/>
+                <a:cs typeface="Times New Roman" panose="02020603050405020304" pitchFamily="18" charset="0"/>
+              </a:rPr>
+              <a:t>Autores</a:t>
+            </a:r>
             <a:r>
               <a:rPr lang="es-ES" sz="2000" dirty="0">
                 <a:effectLst/>
@@ -12471,7 +13758,67 @@
                 <a:ea typeface="Times New Roman" panose="02020603050405020304" pitchFamily="18" charset="0"/>
                 <a:cs typeface="Times New Roman" panose="02020603050405020304" pitchFamily="18" charset="0"/>
               </a:rPr>
-              <a:t>Registrar y gestionar consejeros, junto con sus evaluaciones de artículos.</a:t>
+              <a:t> y su información asociada (datos, documentos y perfil militar)</a:t>
+            </a:r>
+          </a:p>
+          <a:p>
+            <a:pPr marL="800100" lvl="1" indent="-342900" algn="just">
+              <a:lnSpc>
+                <a:spcPct val="150000"/>
+              </a:lnSpc>
+              <a:buFont typeface="Symbol" panose="05050102010706020507" pitchFamily="18" charset="2"/>
+              <a:buChar char=""/>
+            </a:pPr>
+            <a:r>
+              <a:rPr lang="es-ES" sz="2000" dirty="0">
+                <a:effectLst/>
+                <a:latin typeface="Arial" panose="020B0604020202020204" pitchFamily="34" charset="0"/>
+                <a:ea typeface="Times New Roman" panose="02020603050405020304" pitchFamily="18" charset="0"/>
+                <a:cs typeface="Times New Roman" panose="02020603050405020304" pitchFamily="18" charset="0"/>
+              </a:rPr>
+              <a:t>Registrar y gestionar </a:t>
+            </a:r>
+            <a:r>
+              <a:rPr lang="es-ES" sz="2000" b="1" dirty="0">
+                <a:solidFill>
+                  <a:srgbClr val="0070C0"/>
+                </a:solidFill>
+                <a:effectLst/>
+                <a:latin typeface="Arial" panose="020B0604020202020204" pitchFamily="34" charset="0"/>
+                <a:ea typeface="Times New Roman" panose="02020603050405020304" pitchFamily="18" charset="0"/>
+                <a:cs typeface="Times New Roman" panose="02020603050405020304" pitchFamily="18" charset="0"/>
+              </a:rPr>
+              <a:t>consejeros</a:t>
+            </a:r>
+            <a:r>
+              <a:rPr lang="es-ES" sz="2000" dirty="0">
+                <a:effectLst/>
+                <a:latin typeface="Arial" panose="020B0604020202020204" pitchFamily="34" charset="0"/>
+                <a:ea typeface="Times New Roman" panose="02020603050405020304" pitchFamily="18" charset="0"/>
+                <a:cs typeface="Times New Roman" panose="02020603050405020304" pitchFamily="18" charset="0"/>
+              </a:rPr>
+              <a:t>, junto con sus </a:t>
+            </a:r>
+            <a:r>
+              <a:rPr lang="es-ES" sz="2000" b="1" dirty="0">
+                <a:solidFill>
+                  <a:srgbClr val="0070C0"/>
+                </a:solidFill>
+                <a:effectLst/>
+                <a:latin typeface="Arial" panose="020B0604020202020204" pitchFamily="34" charset="0"/>
+                <a:ea typeface="Times New Roman" panose="02020603050405020304" pitchFamily="18" charset="0"/>
+                <a:cs typeface="Times New Roman" panose="02020603050405020304" pitchFamily="18" charset="0"/>
+              </a:rPr>
+              <a:t>evaluaciones</a:t>
+            </a:r>
+            <a:r>
+              <a:rPr lang="es-ES" sz="2000" dirty="0">
+                <a:effectLst/>
+                <a:latin typeface="Arial" panose="020B0604020202020204" pitchFamily="34" charset="0"/>
+                <a:ea typeface="Times New Roman" panose="02020603050405020304" pitchFamily="18" charset="0"/>
+                <a:cs typeface="Times New Roman" panose="02020603050405020304" pitchFamily="18" charset="0"/>
+              </a:rPr>
+              <a:t> de artículos.</a:t>
             </a:r>
           </a:p>
           <a:p>
@@ -12492,7 +13839,28 @@
                 <a:ea typeface="Times New Roman" panose="02020603050405020304" pitchFamily="18" charset="0"/>
                 <a:cs typeface="Times New Roman" panose="02020603050405020304" pitchFamily="18" charset="0"/>
               </a:rPr>
-              <a:t>Consolidar los artículos en Números de Revista, con control editorial básico.</a:t>
+              <a:t>Consolidar los artículos en </a:t>
+            </a:r>
+            <a:r>
+              <a:rPr lang="es-ES" sz="2000" b="1" dirty="0">
+                <a:solidFill>
+                  <a:srgbClr val="0070C0"/>
+                </a:solidFill>
+                <a:effectLst/>
+                <a:latin typeface="Arial" panose="020B0604020202020204" pitchFamily="34" charset="0"/>
+                <a:ea typeface="Times New Roman" panose="02020603050405020304" pitchFamily="18" charset="0"/>
+                <a:cs typeface="Times New Roman" panose="02020603050405020304" pitchFamily="18" charset="0"/>
+              </a:rPr>
+              <a:t>Números de Revista</a:t>
+            </a:r>
+            <a:r>
+              <a:rPr lang="es-ES" sz="2000" dirty="0">
+                <a:effectLst/>
+                <a:latin typeface="Arial" panose="020B0604020202020204" pitchFamily="34" charset="0"/>
+                <a:ea typeface="Times New Roman" panose="02020603050405020304" pitchFamily="18" charset="0"/>
+                <a:cs typeface="Times New Roman" panose="02020603050405020304" pitchFamily="18" charset="0"/>
+              </a:rPr>
+              <a:t>, con control editorial básico.</a:t>
             </a:r>
           </a:p>
           <a:p>

</xml_diff>

<commit_message>
Mod Presentación Sprint 01.
</commit_message>
<xml_diff>
--- a/Presentaciones/Sprint 01_Review.pptx
+++ b/Presentaciones/Sprint 01_Review.pptx
@@ -18015,7 +18015,7 @@
         </p:nvSpPr>
         <p:spPr>
           <a:xfrm>
-            <a:off x="3749366" y="943642"/>
+            <a:off x="877649" y="942019"/>
             <a:ext cx="7667946" cy="2246769"/>
           </a:xfrm>
           <a:prstGeom prst="rect">
@@ -18068,6 +18068,68 @@
               <a:t>Gestión de Números de Revista</a:t>
             </a:r>
             <a:endParaRPr lang="es-ES" sz="2800" dirty="0"/>
+          </a:p>
+          <a:p>
+            <a:endParaRPr lang="es-ES" sz="2800" dirty="0"/>
+          </a:p>
+        </p:txBody>
+      </p:sp>
+      <p:sp>
+        <p:nvSpPr>
+          <p:cNvPr id="2" name="CuadroTexto 1">
+            <a:extLst>
+              <a:ext uri="{FF2B5EF4-FFF2-40B4-BE49-F238E27FC236}">
+                <a16:creationId xmlns:a16="http://schemas.microsoft.com/office/drawing/2014/main" id="{8F63AC8E-7E15-4CDF-405B-7A77C6633556}"/>
+              </a:ext>
+            </a:extLst>
+          </p:cNvPr>
+          <p:cNvSpPr txBox="1"/>
+          <p:nvPr/>
+        </p:nvSpPr>
+        <p:spPr>
+          <a:xfrm>
+            <a:off x="7821479" y="1022299"/>
+            <a:ext cx="4877250" cy="1815882"/>
+          </a:xfrm>
+          <a:prstGeom prst="rect">
+            <a:avLst/>
+          </a:prstGeom>
+          <a:noFill/>
+        </p:spPr>
+        <p:txBody>
+          <a:bodyPr wrap="square" rtlCol="0">
+            <a:spAutoFit/>
+          </a:bodyPr>
+          <a:lstStyle/>
+          <a:p>
+            <a:r>
+              <a:rPr lang="es-ES" sz="2800" b="1" dirty="0">
+                <a:solidFill>
+                  <a:srgbClr val="0070C0"/>
+                </a:solidFill>
+              </a:rPr>
+              <a:t>29 Tareas</a:t>
+            </a:r>
+          </a:p>
+          <a:p>
+            <a:pPr marL="457200" indent="-457200">
+              <a:buFont typeface="Arial" panose="020B0604020202020204" pitchFamily="34" charset="0"/>
+              <a:buChar char="•"/>
+            </a:pPr>
+            <a:r>
+              <a:rPr lang="es-ES" sz="2800" b="1" dirty="0"/>
+              <a:t>180 horas</a:t>
+            </a:r>
+          </a:p>
+          <a:p>
+            <a:pPr marL="457200" indent="-457200">
+              <a:buFont typeface="Arial" panose="020B0604020202020204" pitchFamily="34" charset="0"/>
+              <a:buChar char="•"/>
+            </a:pPr>
+            <a:r>
+              <a:rPr lang="es-ES" sz="2800" b="1" dirty="0"/>
+              <a:t>22 días</a:t>
+            </a:r>
           </a:p>
           <a:p>
             <a:endParaRPr lang="es-ES" sz="2800" dirty="0"/>

</xml_diff>

<commit_message>
Actualizacion presentacion sprint1 demo.
</commit_message>
<xml_diff>
--- a/Presentaciones/Sprint 01_Review.pptx
+++ b/Presentaciones/Sprint 01_Review.pptx
@@ -11194,6 +11194,179 @@
                 <a:srgbClr val="000000"/>
               </a:solidFill>
               <a:latin typeface="Arial"/>
+            </a:endParaRPr>
+          </a:p>
+        </p:txBody>
+      </p:sp>
+      <p:sp>
+        <p:nvSpPr>
+          <p:cNvPr id="4" name="CuadroTexto 3">
+            <a:extLst>
+              <a:ext uri="{FF2B5EF4-FFF2-40B4-BE49-F238E27FC236}">
+                <a16:creationId xmlns:a16="http://schemas.microsoft.com/office/drawing/2014/main" id="{67688670-4E32-F302-2604-41D36F47DEC0}"/>
+              </a:ext>
+            </a:extLst>
+          </p:cNvPr>
+          <p:cNvSpPr txBox="1"/>
+          <p:nvPr/>
+        </p:nvSpPr>
+        <p:spPr>
+          <a:xfrm>
+            <a:off x="610920" y="1547010"/>
+            <a:ext cx="10970160" cy="4167488"/>
+          </a:xfrm>
+          <a:prstGeom prst="rect">
+            <a:avLst/>
+          </a:prstGeom>
+          <a:noFill/>
+        </p:spPr>
+        <p:txBody>
+          <a:bodyPr wrap="square">
+            <a:spAutoFit/>
+          </a:bodyPr>
+          <a:lstStyle/>
+          <a:p>
+            <a:pPr indent="288290" algn="just">
+              <a:lnSpc>
+                <a:spcPct val="150000"/>
+              </a:lnSpc>
+              <a:spcBef>
+                <a:spcPts val="900"/>
+              </a:spcBef>
+              <a:spcAft>
+                <a:spcPts val="900"/>
+              </a:spcAft>
+            </a:pPr>
+            <a:r>
+              <a:rPr lang="es-ES" sz="2800" b="1" dirty="0">
+                <a:latin typeface="Arial" panose="020B0604020202020204" pitchFamily="34" charset="0"/>
+                <a:ea typeface="Times New Roman" panose="02020603050405020304" pitchFamily="18" charset="0"/>
+                <a:cs typeface="Times New Roman" panose="02020603050405020304" pitchFamily="18" charset="0"/>
+              </a:rPr>
+              <a:t>Enlaces aplicación en servidor SEATTD</a:t>
+            </a:r>
+            <a:r>
+              <a:rPr lang="es-ES" sz="2800" b="1" dirty="0">
+                <a:effectLst/>
+                <a:latin typeface="Arial" panose="020B0604020202020204" pitchFamily="34" charset="0"/>
+                <a:ea typeface="Times New Roman" panose="02020603050405020304" pitchFamily="18" charset="0"/>
+                <a:cs typeface="Times New Roman" panose="02020603050405020304" pitchFamily="18" charset="0"/>
+              </a:rPr>
+              <a:t>: </a:t>
+            </a:r>
+          </a:p>
+          <a:p>
+            <a:pPr lvl="2" indent="288290" algn="just">
+              <a:lnSpc>
+                <a:spcPct val="150000"/>
+              </a:lnSpc>
+              <a:spcBef>
+                <a:spcPts val="900"/>
+              </a:spcBef>
+              <a:spcAft>
+                <a:spcPts val="900"/>
+              </a:spcAft>
+            </a:pPr>
+            <a:endParaRPr lang="es-ES" sz="2800" b="1" dirty="0">
+              <a:latin typeface="Arial" panose="020B0604020202020204" pitchFamily="34" charset="0"/>
+              <a:ea typeface="Times New Roman" panose="02020603050405020304" pitchFamily="18" charset="0"/>
+              <a:cs typeface="Times New Roman" panose="02020603050405020304" pitchFamily="18" charset="0"/>
+            </a:endParaRPr>
+          </a:p>
+          <a:p>
+            <a:pPr lvl="2" indent="288290" algn="just">
+              <a:lnSpc>
+                <a:spcPct val="150000"/>
+              </a:lnSpc>
+              <a:spcBef>
+                <a:spcPts val="900"/>
+              </a:spcBef>
+              <a:spcAft>
+                <a:spcPts val="900"/>
+              </a:spcAft>
+            </a:pPr>
+            <a:r>
+              <a:rPr lang="es-ES" sz="2800" dirty="0">
+                <a:latin typeface="Arial" panose="020B0604020202020204" pitchFamily="34" charset="0"/>
+                <a:ea typeface="Times New Roman" panose="02020603050405020304" pitchFamily="18" charset="0"/>
+                <a:cs typeface="Times New Roman" panose="02020603050405020304" pitchFamily="18" charset="0"/>
+              </a:rPr>
+              <a:t>Pruebas</a:t>
+            </a:r>
+            <a:r>
+              <a:rPr lang="es-ES" sz="2800" b="1" dirty="0">
+                <a:latin typeface="Arial" panose="020B0604020202020204" pitchFamily="34" charset="0"/>
+                <a:ea typeface="Times New Roman" panose="02020603050405020304" pitchFamily="18" charset="0"/>
+                <a:cs typeface="Times New Roman" panose="02020603050405020304" pitchFamily="18" charset="0"/>
+              </a:rPr>
+              <a:t>: </a:t>
+            </a:r>
+            <a:r>
+              <a:rPr lang="es-ES" sz="2800" dirty="0">
+                <a:hlinkClick r:id="rId5"/>
+              </a:rPr>
+              <a:t>http://srvcgewww77:9080/nabu/index.html</a:t>
+            </a:r>
+            <a:endParaRPr lang="es-ES" sz="2800" dirty="0"/>
+          </a:p>
+          <a:p>
+            <a:pPr lvl="2" indent="288290" algn="just">
+              <a:lnSpc>
+                <a:spcPct val="150000"/>
+              </a:lnSpc>
+              <a:spcBef>
+                <a:spcPts val="900"/>
+              </a:spcBef>
+              <a:spcAft>
+                <a:spcPts val="900"/>
+              </a:spcAft>
+            </a:pPr>
+            <a:r>
+              <a:rPr lang="es-ES" sz="2800" dirty="0">
+                <a:latin typeface="Arial" panose="020B0604020202020204" pitchFamily="34" charset="0"/>
+                <a:ea typeface="Times New Roman" panose="02020603050405020304" pitchFamily="18" charset="0"/>
+                <a:cs typeface="Times New Roman" panose="02020603050405020304" pitchFamily="18" charset="0"/>
+              </a:rPr>
+              <a:t>Desarrollo</a:t>
+            </a:r>
+            <a:r>
+              <a:rPr lang="es-ES" sz="2800" b="1" dirty="0">
+                <a:latin typeface="Arial" panose="020B0604020202020204" pitchFamily="34" charset="0"/>
+                <a:ea typeface="Times New Roman" panose="02020603050405020304" pitchFamily="18" charset="0"/>
+                <a:cs typeface="Times New Roman" panose="02020603050405020304" pitchFamily="18" charset="0"/>
+              </a:rPr>
+              <a:t>: </a:t>
+            </a:r>
+            <a:r>
+              <a:rPr lang="es-ES" sz="2800" dirty="0">
+                <a:hlinkClick r:id="rId6"/>
+              </a:rPr>
+              <a:t>http://srvcgewww76:9080/nabu/index.html</a:t>
+            </a:r>
+            <a:endParaRPr lang="es-ES" sz="2800" b="1" dirty="0">
+              <a:effectLst/>
+              <a:latin typeface="Arial" panose="020B0604020202020204" pitchFamily="34" charset="0"/>
+              <a:ea typeface="Times New Roman" panose="02020603050405020304" pitchFamily="18" charset="0"/>
+              <a:cs typeface="Times New Roman" panose="02020603050405020304" pitchFamily="18" charset="0"/>
+            </a:endParaRPr>
+          </a:p>
+          <a:p>
+            <a:pPr lvl="2" indent="288290" algn="just">
+              <a:lnSpc>
+                <a:spcPct val="150000"/>
+              </a:lnSpc>
+              <a:spcBef>
+                <a:spcPts val="900"/>
+              </a:spcBef>
+              <a:spcAft>
+                <a:spcPts val="900"/>
+              </a:spcAft>
+            </a:pPr>
+            <a:endParaRPr lang="es-ES" sz="2800" b="1" dirty="0">
+              <a:effectLst/>
+              <a:latin typeface="Arial" panose="020B0604020202020204" pitchFamily="34" charset="0"/>
+              <a:ea typeface="Times New Roman" panose="02020603050405020304" pitchFamily="18" charset="0"/>
+              <a:cs typeface="Times New Roman" panose="02020603050405020304" pitchFamily="18" charset="0"/>
             </a:endParaRPr>
           </a:p>
         </p:txBody>

</xml_diff>